<commit_message>
Added slide with data from new set
</commit_message>
<xml_diff>
--- a/Pictures for presentation/Presentation_MP.pptx
+++ b/Pictures for presentation/Presentation_MP.pptx
@@ -5,7 +5,7 @@
     <p:sldMasterId id="2147483648" r:id="rId1"/>
   </p:sldMasterIdLst>
   <p:notesMasterIdLst>
-    <p:notesMasterId r:id="rId13"/>
+    <p:notesMasterId r:id="rId14"/>
   </p:notesMasterIdLst>
   <p:sldIdLst>
     <p:sldId id="256" r:id="rId2"/>
@@ -19,6 +19,7 @@
     <p:sldId id="265" r:id="rId10"/>
     <p:sldId id="266" r:id="rId11"/>
     <p:sldId id="267" r:id="rId12"/>
+    <p:sldId id="268" r:id="rId13"/>
   </p:sldIdLst>
   <p:sldSz cx="9144000" cy="6858000" type="screen4x3"/>
   <p:notesSz cx="6858000" cy="9144000"/>
@@ -4082,6 +4083,356 @@
           </a:prstGeom>
         </p:spPr>
       </p:pic>
+    </p:spTree>
+  </p:cSld>
+  <p:clrMapOvr>
+    <a:masterClrMapping/>
+  </p:clrMapOvr>
+</p:sld>
+</file>
+
+<file path=ppt/slides/slide12.xml><?xml version="1.0" encoding="utf-8"?>
+<p:sld xmlns:a="http://schemas.openxmlformats.org/drawingml/2006/main" xmlns:r="http://schemas.openxmlformats.org/officeDocument/2006/relationships" xmlns:mc="http://schemas.openxmlformats.org/markup-compatibility/2006" xmlns:mv="urn:schemas-microsoft-com:mac:vml" xmlns:p="http://schemas.openxmlformats.org/presentationml/2006/main" mc:Ignorable="mv" mc:PreserveAttributes="mv:*">
+  <p:cSld>
+    <p:spTree>
+      <p:nvGrpSpPr>
+        <p:cNvPr id="1" name=""/>
+        <p:cNvGrpSpPr/>
+        <p:nvPr/>
+      </p:nvGrpSpPr>
+      <p:grpSpPr>
+        <a:xfrm>
+          <a:off x="0" y="0"/>
+          <a:ext cx="0" cy="0"/>
+          <a:chOff x="0" y="0"/>
+          <a:chExt cx="0" cy="0"/>
+        </a:xfrm>
+      </p:grpSpPr>
+      <p:grpSp>
+        <p:nvGrpSpPr>
+          <p:cNvPr id="15" name="Group 14"/>
+          <p:cNvGrpSpPr/>
+          <p:nvPr/>
+        </p:nvGrpSpPr>
+        <p:grpSpPr>
+          <a:xfrm>
+            <a:off x="2324042" y="1247763"/>
+            <a:ext cx="3744599" cy="3926708"/>
+            <a:chOff x="2358889" y="1539478"/>
+            <a:chExt cx="3744599" cy="3926708"/>
+          </a:xfrm>
+        </p:grpSpPr>
+        <p:pic>
+          <p:nvPicPr>
+            <p:cNvPr id="5" name="Picture 4"/>
+            <p:cNvPicPr>
+              <a:picLocks noChangeAspect="1"/>
+            </p:cNvPicPr>
+            <p:nvPr/>
+          </p:nvPicPr>
+          <mc:AlternateContent>
+            <mc:Choice xmlns:ma="http://schemas.microsoft.com/office/mac/drawingml/2008/main" Requires="ma">
+              <p:blipFill>
+                <a:blip r:embed="rId2"/>
+                <a:srcRect l="31246" t="23575" r="22224" b="9909"/>
+                <a:stretch>
+                  <a:fillRect/>
+                </a:stretch>
+              </p:blipFill>
+            </mc:Choice>
+            <mc:Fallback>
+              <p:blipFill>
+                <a:blip r:embed="rId3"/>
+                <a:srcRect l="31246" t="23575" r="22224" b="9909"/>
+                <a:stretch>
+                  <a:fillRect/>
+                </a:stretch>
+              </p:blipFill>
+            </mc:Fallback>
+          </mc:AlternateContent>
+          <p:spPr>
+            <a:xfrm>
+              <a:off x="3090393" y="2485834"/>
+              <a:ext cx="3013095" cy="2593915"/>
+            </a:xfrm>
+            <a:prstGeom prst="rect">
+              <a:avLst/>
+            </a:prstGeom>
+          </p:spPr>
+        </p:pic>
+        <p:pic>
+          <p:nvPicPr>
+            <p:cNvPr id="14" name="Picture 13"/>
+            <p:cNvPicPr>
+              <a:picLocks noChangeAspect="1"/>
+            </p:cNvPicPr>
+            <p:nvPr/>
+          </p:nvPicPr>
+          <mc:AlternateContent>
+            <mc:Choice xmlns:ma="http://schemas.microsoft.com/office/mac/drawingml/2008/main" Requires="ma">
+              <p:blipFill>
+                <a:blip r:embed="rId4"/>
+                <a:srcRect l="2055" r="86606"/>
+                <a:stretch>
+                  <a:fillRect/>
+                </a:stretch>
+              </p:blipFill>
+            </mc:Choice>
+            <mc:Fallback>
+              <p:blipFill>
+                <a:blip r:embed="rId5"/>
+                <a:srcRect l="2055" r="86606"/>
+                <a:stretch>
+                  <a:fillRect/>
+                </a:stretch>
+              </p:blipFill>
+            </mc:Fallback>
+          </mc:AlternateContent>
+          <p:spPr>
+            <a:xfrm>
+              <a:off x="2358889" y="1539478"/>
+              <a:ext cx="739368" cy="3926708"/>
+            </a:xfrm>
+            <a:prstGeom prst="rect">
+              <a:avLst/>
+            </a:prstGeom>
+          </p:spPr>
+        </p:pic>
+      </p:grpSp>
+      <p:sp>
+        <p:nvSpPr>
+          <p:cNvPr id="16" name="TextBox 15"/>
+          <p:cNvSpPr txBox="1"/>
+          <p:nvPr/>
+        </p:nvSpPr>
+        <p:spPr>
+          <a:xfrm>
+            <a:off x="3752724" y="0"/>
+            <a:ext cx="1638552" cy="615553"/>
+          </a:xfrm>
+          <a:prstGeom prst="rect">
+            <a:avLst/>
+          </a:prstGeom>
+          <a:noFill/>
+        </p:spPr>
+        <p:txBody>
+          <a:bodyPr wrap="none" rtlCol="0">
+            <a:spAutoFit/>
+          </a:bodyPr>
+          <a:lstStyle/>
+          <a:p>
+            <a:r>
+              <a:rPr lang="en-US" sz="3400" dirty="0" smtClean="0">
+                <a:latin typeface="Arial"/>
+                <a:cs typeface="Arial"/>
+              </a:rPr>
+              <a:t>Results</a:t>
+            </a:r>
+            <a:endParaRPr lang="en-US" sz="3400" dirty="0">
+              <a:latin typeface="Arial"/>
+              <a:cs typeface="Arial"/>
+            </a:endParaRPr>
+          </a:p>
+        </p:txBody>
+      </p:sp>
+      <p:sp>
+        <p:nvSpPr>
+          <p:cNvPr id="17" name="TextBox 16"/>
+          <p:cNvSpPr txBox="1"/>
+          <p:nvPr/>
+        </p:nvSpPr>
+        <p:spPr>
+          <a:xfrm>
+            <a:off x="3544516" y="1106591"/>
+            <a:ext cx="1929547" cy="369332"/>
+          </a:xfrm>
+          <a:prstGeom prst="rect">
+            <a:avLst/>
+          </a:prstGeom>
+          <a:noFill/>
+        </p:spPr>
+        <p:txBody>
+          <a:bodyPr wrap="none" rtlCol="0">
+            <a:spAutoFit/>
+          </a:bodyPr>
+          <a:lstStyle/>
+          <a:p>
+            <a:r>
+              <a:rPr lang="en-US" dirty="0" smtClean="0">
+                <a:latin typeface="Arial"/>
+                <a:cs typeface="Arial"/>
+              </a:rPr>
+              <a:t>Predictive values</a:t>
+            </a:r>
+            <a:endParaRPr lang="en-US" dirty="0">
+              <a:latin typeface="Arial"/>
+              <a:cs typeface="Arial"/>
+            </a:endParaRPr>
+          </a:p>
+        </p:txBody>
+      </p:sp>
+      <p:grpSp>
+        <p:nvGrpSpPr>
+          <p:cNvPr id="18" name="Group 17"/>
+          <p:cNvGrpSpPr/>
+          <p:nvPr/>
+        </p:nvGrpSpPr>
+        <p:grpSpPr>
+          <a:xfrm>
+            <a:off x="3175233" y="4566371"/>
+            <a:ext cx="2879896" cy="369332"/>
+            <a:chOff x="3229281" y="4566371"/>
+            <a:chExt cx="2879896" cy="369332"/>
+          </a:xfrm>
+        </p:grpSpPr>
+        <p:sp>
+          <p:nvSpPr>
+            <p:cNvPr id="19" name="TextBox 18"/>
+            <p:cNvSpPr txBox="1"/>
+            <p:nvPr/>
+          </p:nvSpPr>
+          <p:spPr>
+            <a:xfrm>
+              <a:off x="3229281" y="4566371"/>
+              <a:ext cx="710802" cy="369332"/>
+            </a:xfrm>
+            <a:prstGeom prst="rect">
+              <a:avLst/>
+            </a:prstGeom>
+            <a:noFill/>
+          </p:spPr>
+          <p:txBody>
+            <a:bodyPr wrap="none" rtlCol="0">
+              <a:spAutoFit/>
+            </a:bodyPr>
+            <a:lstStyle/>
+            <a:p>
+              <a:r>
+                <a:rPr lang="en-US" dirty="0" smtClean="0">
+                  <a:latin typeface="Arial"/>
+                  <a:cs typeface="Arial"/>
+                </a:rPr>
+                <a:t>Food</a:t>
+              </a:r>
+              <a:endParaRPr lang="en-US" dirty="0">
+                <a:latin typeface="Arial"/>
+                <a:cs typeface="Arial"/>
+              </a:endParaRPr>
+            </a:p>
+          </p:txBody>
+        </p:sp>
+        <p:sp>
+          <p:nvSpPr>
+            <p:cNvPr id="20" name="TextBox 19"/>
+            <p:cNvSpPr txBox="1"/>
+            <p:nvPr/>
+          </p:nvSpPr>
+          <p:spPr>
+            <a:xfrm>
+              <a:off x="5205752" y="4566371"/>
+              <a:ext cx="903425" cy="369332"/>
+            </a:xfrm>
+            <a:prstGeom prst="rect">
+              <a:avLst/>
+            </a:prstGeom>
+            <a:noFill/>
+          </p:spPr>
+          <p:txBody>
+            <a:bodyPr wrap="none" rtlCol="0">
+              <a:spAutoFit/>
+            </a:bodyPr>
+            <a:lstStyle/>
+            <a:p>
+              <a:r>
+                <a:rPr lang="en-US" dirty="0" smtClean="0">
+                  <a:latin typeface="Arial"/>
+                  <a:cs typeface="Arial"/>
+                </a:rPr>
+                <a:t>People</a:t>
+              </a:r>
+              <a:endParaRPr lang="en-US" dirty="0">
+                <a:latin typeface="Arial"/>
+                <a:cs typeface="Arial"/>
+              </a:endParaRPr>
+            </a:p>
+          </p:txBody>
+        </p:sp>
+      </p:grpSp>
+      <p:sp>
+        <p:nvSpPr>
+          <p:cNvPr id="21" name="TextBox 20"/>
+          <p:cNvSpPr txBox="1"/>
+          <p:nvPr/>
+        </p:nvSpPr>
+        <p:spPr>
+          <a:xfrm>
+            <a:off x="2034283" y="5133941"/>
+            <a:ext cx="5160237" cy="769441"/>
+          </a:xfrm>
+          <a:prstGeom prst="rect">
+            <a:avLst/>
+          </a:prstGeom>
+          <a:noFill/>
+        </p:spPr>
+        <p:txBody>
+          <a:bodyPr wrap="none" rtlCol="0">
+            <a:spAutoFit/>
+          </a:bodyPr>
+          <a:lstStyle/>
+          <a:p>
+            <a:pPr algn="ctr"/>
+            <a:r>
+              <a:rPr lang="en-US" sz="2000" dirty="0" smtClean="0">
+                <a:latin typeface="Arial"/>
+                <a:cs typeface="Arial"/>
+              </a:rPr>
+              <a:t>If we say a picture contains food (or people)</a:t>
+            </a:r>
+          </a:p>
+          <a:p>
+            <a:pPr algn="ctr"/>
+            <a:r>
+              <a:rPr lang="en-US" sz="2000" dirty="0">
+                <a:latin typeface="Arial"/>
+                <a:cs typeface="Arial"/>
+              </a:rPr>
+              <a:t>w</a:t>
+            </a:r>
+            <a:r>
+              <a:rPr lang="en-US" sz="2000" dirty="0" smtClean="0">
+                <a:latin typeface="Arial"/>
+                <a:cs typeface="Arial"/>
+              </a:rPr>
+              <a:t>e are right </a:t>
+            </a:r>
+            <a:r>
+              <a:rPr lang="en-US" sz="2400" dirty="0" smtClean="0">
+                <a:latin typeface="Arial"/>
+                <a:cs typeface="Arial"/>
+              </a:rPr>
+              <a:t>~</a:t>
+            </a:r>
+            <a:r>
+              <a:rPr lang="en-US" sz="2400" dirty="0" smtClean="0">
+                <a:latin typeface="Arial"/>
+                <a:cs typeface="Arial"/>
+              </a:rPr>
+              <a:t>83% </a:t>
+            </a:r>
+            <a:r>
+              <a:rPr lang="en-US" sz="2000" dirty="0" smtClean="0">
+                <a:latin typeface="Arial"/>
+                <a:cs typeface="Arial"/>
+              </a:rPr>
+              <a:t>of the times!</a:t>
+            </a:r>
+            <a:endParaRPr lang="en-US" sz="2000" dirty="0">
+              <a:latin typeface="Arial"/>
+              <a:cs typeface="Arial"/>
+            </a:endParaRPr>
+          </a:p>
+        </p:txBody>
+      </p:sp>
     </p:spTree>
   </p:cSld>
   <p:clrMapOvr>

</xml_diff>